<commit_message>
Update Nghe nhạc đoán tên bài hát.pptx
</commit_message>
<xml_diff>
--- a/Nghe nhạc đoán tên bài hát.pptx
+++ b/Nghe nhạc đoán tên bài hát.pptx
@@ -115,6 +115,11 @@
       </a:defRPr>
     </a:lvl9pPr>
   </p:defaultTextStyle>
+  <p:extLst>
+    <p:ext uri="{EFAFB233-063F-42B5-8137-9DF3F51BA10A}">
+      <p15:sldGuideLst xmlns:p15="http://schemas.microsoft.com/office/powerpoint/2012/main"/>
+    </p:ext>
+  </p:extLst>
 </p:presentation>
 </file>
 
@@ -4635,13 +4640,13 @@
   <p:clrMapOvr>
     <a:masterClrMapping/>
   </p:clrMapOvr>
-  <mc:AlternateContent xmlns:mc="http://schemas.openxmlformats.org/markup-compatibility/2006">
-    <mc:Choice xmlns:p15="http://schemas.microsoft.com/office/powerpoint/2012/main" Requires="p15">
+  <mc:AlternateContent xmlns:mc="http://schemas.openxmlformats.org/markup-compatibility/2006" xmlns:p15="http://schemas.microsoft.com/office/powerpoint/2012/main">
+    <mc:Choice Requires="p15">
       <p:transition xmlns:p14="http://schemas.microsoft.com/office/powerpoint/2010/main" spd="slow" p14:dur="2000">
         <p15:prstTrans prst="prestige"/>
       </p:transition>
     </mc:Choice>
-    <mc:Fallback>
+    <mc:Fallback xmlns="">
       <p:transition spd="slow">
         <p:fade/>
       </p:transition>
@@ -4988,18 +4993,385 @@
   <p:clrMapOvr>
     <a:masterClrMapping/>
   </p:clrMapOvr>
-  <mc:AlternateContent xmlns:mc="http://schemas.openxmlformats.org/markup-compatibility/2006">
-    <mc:Choice xmlns:p14="http://schemas.microsoft.com/office/powerpoint/2010/main" Requires="p14">
+  <mc:AlternateContent xmlns:mc="http://schemas.openxmlformats.org/markup-compatibility/2006" xmlns:p14="http://schemas.microsoft.com/office/powerpoint/2010/main">
+    <mc:Choice Requires="p14">
       <p:transition spd="slow" p14:dur="3400">
         <p14:reveal/>
       </p:transition>
     </mc:Choice>
-    <mc:Fallback>
+    <mc:Fallback xmlns="">
       <p:transition spd="slow">
         <p:fade/>
       </p:transition>
     </mc:Fallback>
   </mc:AlternateContent>
+  <p:timing>
+    <p:tnLst>
+      <p:par>
+        <p:cTn id="1" dur="indefinite" restart="never" nodeType="tmRoot">
+          <p:childTnLst>
+            <p:seq concurrent="1" nextAc="seek">
+              <p:cTn id="2" dur="indefinite" nodeType="mainSeq">
+                <p:childTnLst>
+                  <p:par>
+                    <p:cTn id="3" fill="hold">
+                      <p:stCondLst>
+                        <p:cond delay="indefinite"/>
+                        <p:cond evt="onBegin" delay="0">
+                          <p:tn val="2"/>
+                        </p:cond>
+                      </p:stCondLst>
+                      <p:childTnLst>
+                        <p:par>
+                          <p:cTn id="4" fill="hold">
+                            <p:stCondLst>
+                              <p:cond delay="0"/>
+                            </p:stCondLst>
+                            <p:childTnLst>
+                              <p:par>
+                                <p:cTn id="5" presetID="2" presetClass="entr" presetSubtype="8" fill="hold" grpId="0" nodeType="withEffect">
+                                  <p:stCondLst>
+                                    <p:cond delay="0"/>
+                                  </p:stCondLst>
+                                  <p:childTnLst>
+                                    <p:set>
+                                      <p:cBhvr>
+                                        <p:cTn id="6" dur="1" fill="hold">
+                                          <p:stCondLst>
+                                            <p:cond delay="0"/>
+                                          </p:stCondLst>
+                                        </p:cTn>
+                                        <p:tgtEl>
+                                          <p:spTgt spid="4"/>
+                                        </p:tgtEl>
+                                        <p:attrNameLst>
+                                          <p:attrName>style.visibility</p:attrName>
+                                        </p:attrNameLst>
+                                      </p:cBhvr>
+                                      <p:to>
+                                        <p:strVal val="visible"/>
+                                      </p:to>
+                                    </p:set>
+                                    <p:anim calcmode="lin" valueType="num">
+                                      <p:cBhvr additive="base">
+                                        <p:cTn id="7" dur="500" fill="hold"/>
+                                        <p:tgtEl>
+                                          <p:spTgt spid="4"/>
+                                        </p:tgtEl>
+                                        <p:attrNameLst>
+                                          <p:attrName>ppt_x</p:attrName>
+                                        </p:attrNameLst>
+                                      </p:cBhvr>
+                                      <p:tavLst>
+                                        <p:tav tm="0">
+                                          <p:val>
+                                            <p:strVal val="0-#ppt_w/2"/>
+                                          </p:val>
+                                        </p:tav>
+                                        <p:tav tm="100000">
+                                          <p:val>
+                                            <p:strVal val="#ppt_x"/>
+                                          </p:val>
+                                        </p:tav>
+                                      </p:tavLst>
+                                    </p:anim>
+                                    <p:anim calcmode="lin" valueType="num">
+                                      <p:cBhvr additive="base">
+                                        <p:cTn id="8" dur="500" fill="hold"/>
+                                        <p:tgtEl>
+                                          <p:spTgt spid="4"/>
+                                        </p:tgtEl>
+                                        <p:attrNameLst>
+                                          <p:attrName>ppt_y</p:attrName>
+                                        </p:attrNameLst>
+                                      </p:cBhvr>
+                                      <p:tavLst>
+                                        <p:tav tm="0">
+                                          <p:val>
+                                            <p:strVal val="#ppt_y"/>
+                                          </p:val>
+                                        </p:tav>
+                                        <p:tav tm="100000">
+                                          <p:val>
+                                            <p:strVal val="#ppt_y"/>
+                                          </p:val>
+                                        </p:tav>
+                                      </p:tavLst>
+                                    </p:anim>
+                                  </p:childTnLst>
+                                </p:cTn>
+                              </p:par>
+                            </p:childTnLst>
+                          </p:cTn>
+                        </p:par>
+                        <p:par>
+                          <p:cTn id="9" fill="hold">
+                            <p:stCondLst>
+                              <p:cond delay="500"/>
+                            </p:stCondLst>
+                            <p:childTnLst>
+                              <p:par>
+                                <p:cTn id="10" presetID="2" presetClass="entr" presetSubtype="8" fill="hold" grpId="0" nodeType="afterEffect">
+                                  <p:stCondLst>
+                                    <p:cond delay="0"/>
+                                  </p:stCondLst>
+                                  <p:childTnLst>
+                                    <p:set>
+                                      <p:cBhvr>
+                                        <p:cTn id="11" dur="1" fill="hold">
+                                          <p:stCondLst>
+                                            <p:cond delay="0"/>
+                                          </p:stCondLst>
+                                        </p:cTn>
+                                        <p:tgtEl>
+                                          <p:spTgt spid="2"/>
+                                        </p:tgtEl>
+                                        <p:attrNameLst>
+                                          <p:attrName>style.visibility</p:attrName>
+                                        </p:attrNameLst>
+                                      </p:cBhvr>
+                                      <p:to>
+                                        <p:strVal val="visible"/>
+                                      </p:to>
+                                    </p:set>
+                                    <p:anim calcmode="lin" valueType="num">
+                                      <p:cBhvr additive="base">
+                                        <p:cTn id="12" dur="500" fill="hold"/>
+                                        <p:tgtEl>
+                                          <p:spTgt spid="2"/>
+                                        </p:tgtEl>
+                                        <p:attrNameLst>
+                                          <p:attrName>ppt_x</p:attrName>
+                                        </p:attrNameLst>
+                                      </p:cBhvr>
+                                      <p:tavLst>
+                                        <p:tav tm="0">
+                                          <p:val>
+                                            <p:strVal val="0-#ppt_w/2"/>
+                                          </p:val>
+                                        </p:tav>
+                                        <p:tav tm="100000">
+                                          <p:val>
+                                            <p:strVal val="#ppt_x"/>
+                                          </p:val>
+                                        </p:tav>
+                                      </p:tavLst>
+                                    </p:anim>
+                                    <p:anim calcmode="lin" valueType="num">
+                                      <p:cBhvr additive="base">
+                                        <p:cTn id="13" dur="500" fill="hold"/>
+                                        <p:tgtEl>
+                                          <p:spTgt spid="2"/>
+                                        </p:tgtEl>
+                                        <p:attrNameLst>
+                                          <p:attrName>ppt_y</p:attrName>
+                                        </p:attrNameLst>
+                                      </p:cBhvr>
+                                      <p:tavLst>
+                                        <p:tav tm="0">
+                                          <p:val>
+                                            <p:strVal val="#ppt_y"/>
+                                          </p:val>
+                                        </p:tav>
+                                        <p:tav tm="100000">
+                                          <p:val>
+                                            <p:strVal val="#ppt_y"/>
+                                          </p:val>
+                                        </p:tav>
+                                      </p:tavLst>
+                                    </p:anim>
+                                  </p:childTnLst>
+                                </p:cTn>
+                              </p:par>
+                            </p:childTnLst>
+                          </p:cTn>
+                        </p:par>
+                        <p:par>
+                          <p:cTn id="14" fill="hold">
+                            <p:stCondLst>
+                              <p:cond delay="1000"/>
+                            </p:stCondLst>
+                            <p:childTnLst>
+                              <p:par>
+                                <p:cTn id="15" presetID="10" presetClass="entr" presetSubtype="0" fill="hold" grpId="0" nodeType="afterEffect">
+                                  <p:stCondLst>
+                                    <p:cond delay="0"/>
+                                  </p:stCondLst>
+                                  <p:childTnLst>
+                                    <p:set>
+                                      <p:cBhvr>
+                                        <p:cTn id="16" dur="1" fill="hold">
+                                          <p:stCondLst>
+                                            <p:cond delay="0"/>
+                                          </p:stCondLst>
+                                        </p:cTn>
+                                        <p:tgtEl>
+                                          <p:spTgt spid="3">
+                                            <p:txEl>
+                                              <p:pRg st="0" end="0"/>
+                                            </p:txEl>
+                                          </p:spTgt>
+                                        </p:tgtEl>
+                                        <p:attrNameLst>
+                                          <p:attrName>style.visibility</p:attrName>
+                                        </p:attrNameLst>
+                                      </p:cBhvr>
+                                      <p:to>
+                                        <p:strVal val="visible"/>
+                                      </p:to>
+                                    </p:set>
+                                    <p:animEffect transition="in" filter="fade">
+                                      <p:cBhvr>
+                                        <p:cTn id="17" dur="500"/>
+                                        <p:tgtEl>
+                                          <p:spTgt spid="3">
+                                            <p:txEl>
+                                              <p:pRg st="0" end="0"/>
+                                            </p:txEl>
+                                          </p:spTgt>
+                                        </p:tgtEl>
+                                      </p:cBhvr>
+                                    </p:animEffect>
+                                  </p:childTnLst>
+                                </p:cTn>
+                              </p:par>
+                            </p:childTnLst>
+                          </p:cTn>
+                        </p:par>
+                        <p:par>
+                          <p:cTn id="18" fill="hold">
+                            <p:stCondLst>
+                              <p:cond delay="1500"/>
+                            </p:stCondLst>
+                            <p:childTnLst>
+                              <p:par>
+                                <p:cTn id="19" presetID="10" presetClass="entr" presetSubtype="0" fill="hold" grpId="0" nodeType="afterEffect">
+                                  <p:stCondLst>
+                                    <p:cond delay="0"/>
+                                  </p:stCondLst>
+                                  <p:childTnLst>
+                                    <p:set>
+                                      <p:cBhvr>
+                                        <p:cTn id="20" dur="1" fill="hold">
+                                          <p:stCondLst>
+                                            <p:cond delay="0"/>
+                                          </p:stCondLst>
+                                        </p:cTn>
+                                        <p:tgtEl>
+                                          <p:spTgt spid="3">
+                                            <p:txEl>
+                                              <p:pRg st="1" end="1"/>
+                                            </p:txEl>
+                                          </p:spTgt>
+                                        </p:tgtEl>
+                                        <p:attrNameLst>
+                                          <p:attrName>style.visibility</p:attrName>
+                                        </p:attrNameLst>
+                                      </p:cBhvr>
+                                      <p:to>
+                                        <p:strVal val="visible"/>
+                                      </p:to>
+                                    </p:set>
+                                    <p:animEffect transition="in" filter="fade">
+                                      <p:cBhvr>
+                                        <p:cTn id="21" dur="500"/>
+                                        <p:tgtEl>
+                                          <p:spTgt spid="3">
+                                            <p:txEl>
+                                              <p:pRg st="1" end="1"/>
+                                            </p:txEl>
+                                          </p:spTgt>
+                                        </p:tgtEl>
+                                      </p:cBhvr>
+                                    </p:animEffect>
+                                  </p:childTnLst>
+                                </p:cTn>
+                              </p:par>
+                            </p:childTnLst>
+                          </p:cTn>
+                        </p:par>
+                        <p:par>
+                          <p:cTn id="22" fill="hold">
+                            <p:stCondLst>
+                              <p:cond delay="2000"/>
+                            </p:stCondLst>
+                            <p:childTnLst>
+                              <p:par>
+                                <p:cTn id="23" presetID="10" presetClass="entr" presetSubtype="0" fill="hold" grpId="0" nodeType="afterEffect">
+                                  <p:stCondLst>
+                                    <p:cond delay="0"/>
+                                  </p:stCondLst>
+                                  <p:childTnLst>
+                                    <p:set>
+                                      <p:cBhvr>
+                                        <p:cTn id="24" dur="1" fill="hold">
+                                          <p:stCondLst>
+                                            <p:cond delay="0"/>
+                                          </p:stCondLst>
+                                        </p:cTn>
+                                        <p:tgtEl>
+                                          <p:spTgt spid="3">
+                                            <p:txEl>
+                                              <p:pRg st="2" end="2"/>
+                                            </p:txEl>
+                                          </p:spTgt>
+                                        </p:tgtEl>
+                                        <p:attrNameLst>
+                                          <p:attrName>style.visibility</p:attrName>
+                                        </p:attrNameLst>
+                                      </p:cBhvr>
+                                      <p:to>
+                                        <p:strVal val="visible"/>
+                                      </p:to>
+                                    </p:set>
+                                    <p:animEffect transition="in" filter="fade">
+                                      <p:cBhvr>
+                                        <p:cTn id="25" dur="500"/>
+                                        <p:tgtEl>
+                                          <p:spTgt spid="3">
+                                            <p:txEl>
+                                              <p:pRg st="2" end="2"/>
+                                            </p:txEl>
+                                          </p:spTgt>
+                                        </p:tgtEl>
+                                      </p:cBhvr>
+                                    </p:animEffect>
+                                  </p:childTnLst>
+                                </p:cTn>
+                              </p:par>
+                            </p:childTnLst>
+                          </p:cTn>
+                        </p:par>
+                      </p:childTnLst>
+                    </p:cTn>
+                  </p:par>
+                </p:childTnLst>
+              </p:cTn>
+              <p:prevCondLst>
+                <p:cond evt="onPrev" delay="0">
+                  <p:tgtEl>
+                    <p:sldTgt/>
+                  </p:tgtEl>
+                </p:cond>
+              </p:prevCondLst>
+              <p:nextCondLst>
+                <p:cond evt="onNext" delay="0">
+                  <p:tgtEl>
+                    <p:sldTgt/>
+                  </p:tgtEl>
+                </p:cond>
+              </p:nextCondLst>
+            </p:seq>
+          </p:childTnLst>
+        </p:cTn>
+      </p:par>
+    </p:tnLst>
+    <p:bldLst>
+      <p:bldP spid="2" grpId="0"/>
+      <p:bldP spid="3" grpId="0" build="p"/>
+      <p:bldP spid="4" grpId="0" animBg="1"/>
+    </p:bldLst>
+  </p:timing>
 </p:sld>
 </file>
 
@@ -9884,7 +10256,7 @@
         <p:spPr>
           <a:xfrm>
             <a:off x="838200" y="2072627"/>
-            <a:ext cx="8061887" cy="4448013"/>
+            <a:ext cx="10147971" cy="4448013"/>
           </a:xfrm>
           <a:prstGeom prst="rect">
             <a:avLst/>
@@ -10062,6 +10434,46 @@
             <a:r>
               <a:rPr lang="en-US" sz="3200" dirty="0"/>
               <a:t> </a:t>
+            </a:r>
+            <a:r>
+              <a:rPr lang="en-US" sz="3200" dirty="0" err="1"/>
+              <a:t>trong</a:t>
+            </a:r>
+            <a:r>
+              <a:rPr lang="en-US" sz="3200" dirty="0"/>
+              <a:t> 15s, </a:t>
+            </a:r>
+            <a:r>
+              <a:rPr lang="en-US" sz="3200" dirty="0" err="1"/>
+              <a:t>hiện</a:t>
+            </a:r>
+            <a:r>
+              <a:rPr lang="en-US" sz="3200" dirty="0"/>
+              <a:t> </a:t>
+            </a:r>
+            <a:r>
+              <a:rPr lang="en-US" sz="3200" dirty="0" err="1"/>
+              <a:t>đáp</a:t>
+            </a:r>
+            <a:r>
+              <a:rPr lang="en-US" sz="3200" dirty="0"/>
+              <a:t> </a:t>
+            </a:r>
+            <a:r>
+              <a:rPr lang="en-US" sz="3200" dirty="0" err="1"/>
+              <a:t>án</a:t>
+            </a:r>
+            <a:r>
+              <a:rPr lang="en-US" sz="3200" dirty="0"/>
+              <a:t> </a:t>
+            </a:r>
+            <a:r>
+              <a:rPr lang="en-US" sz="3200" dirty="0" err="1"/>
+              <a:t>trong</a:t>
+            </a:r>
+            <a:r>
+              <a:rPr lang="en-US" sz="3200" dirty="0"/>
+              <a:t> 10s</a:t>
             </a:r>
           </a:p>
           <a:p>
@@ -11700,13 +12112,13 @@
   <p:clrMapOvr>
     <a:masterClrMapping/>
   </p:clrMapOvr>
-  <mc:AlternateContent xmlns:mc="http://schemas.openxmlformats.org/markup-compatibility/2006">
-    <mc:Choice xmlns:p14="http://schemas.microsoft.com/office/powerpoint/2010/main" Requires="p14">
+  <mc:AlternateContent xmlns:mc="http://schemas.openxmlformats.org/markup-compatibility/2006" xmlns:p14="http://schemas.microsoft.com/office/powerpoint/2010/main">
+    <mc:Choice Requires="p14">
       <p:transition spd="slow" p14:dur="2000">
         <p14:ferris dir="l"/>
       </p:transition>
     </mc:Choice>
-    <mc:Fallback>
+    <mc:Fallback xmlns="">
       <p:transition spd="slow">
         <p:fade/>
       </p:transition>

</xml_diff>